<commit_message>
added impl. chapter + discussion + conclusion + future work+ adjustments  on localization experiment
</commit_message>
<xml_diff>
--- a/assets/ch2/Diagrams/sys_arch_diagrams.pptx
+++ b/assets/ch2/Diagrams/sys_arch_diagrams.pptx
@@ -5,7 +5,7 @@
     <p:sldMasterId id="2147483660" r:id="rId1"/>
   </p:sldMasterIdLst>
   <p:sldIdLst>
-    <p:sldId id="256" r:id="rId2"/>
+    <p:sldId id="257" r:id="rId2"/>
   </p:sldIdLst>
   <p:sldSz cx="36483925" cy="20574000"/>
   <p:notesSz cx="6858000" cy="9144000"/>
@@ -243,7 +243,7 @@
           <a:p>
             <a:fld id="{ADCE79A2-4347-4199-9D2E-DCCB73A3C4A8}" type="datetimeFigureOut">
               <a:rPr lang="en-US" smtClean="0"/>
-              <a:t>11/27/2024</a:t>
+              <a:t>4/28/2025</a:t>
             </a:fld>
             <a:endParaRPr lang="en-US"/>
           </a:p>
@@ -413,7 +413,7 @@
           <a:p>
             <a:fld id="{ADCE79A2-4347-4199-9D2E-DCCB73A3C4A8}" type="datetimeFigureOut">
               <a:rPr lang="en-US" smtClean="0"/>
-              <a:t>11/27/2024</a:t>
+              <a:t>4/28/2025</a:t>
             </a:fld>
             <a:endParaRPr lang="en-US"/>
           </a:p>
@@ -593,7 +593,7 @@
           <a:p>
             <a:fld id="{ADCE79A2-4347-4199-9D2E-DCCB73A3C4A8}" type="datetimeFigureOut">
               <a:rPr lang="en-US" smtClean="0"/>
-              <a:t>11/27/2024</a:t>
+              <a:t>4/28/2025</a:t>
             </a:fld>
             <a:endParaRPr lang="en-US"/>
           </a:p>
@@ -763,7 +763,7 @@
           <a:p>
             <a:fld id="{ADCE79A2-4347-4199-9D2E-DCCB73A3C4A8}" type="datetimeFigureOut">
               <a:rPr lang="en-US" smtClean="0"/>
-              <a:t>11/27/2024</a:t>
+              <a:t>4/28/2025</a:t>
             </a:fld>
             <a:endParaRPr lang="en-US"/>
           </a:p>
@@ -1009,7 +1009,7 @@
           <a:p>
             <a:fld id="{ADCE79A2-4347-4199-9D2E-DCCB73A3C4A8}" type="datetimeFigureOut">
               <a:rPr lang="en-US" smtClean="0"/>
-              <a:t>11/27/2024</a:t>
+              <a:t>4/28/2025</a:t>
             </a:fld>
             <a:endParaRPr lang="en-US"/>
           </a:p>
@@ -1241,7 +1241,7 @@
           <a:p>
             <a:fld id="{ADCE79A2-4347-4199-9D2E-DCCB73A3C4A8}" type="datetimeFigureOut">
               <a:rPr lang="en-US" smtClean="0"/>
-              <a:t>11/27/2024</a:t>
+              <a:t>4/28/2025</a:t>
             </a:fld>
             <a:endParaRPr lang="en-US"/>
           </a:p>
@@ -1608,7 +1608,7 @@
           <a:p>
             <a:fld id="{ADCE79A2-4347-4199-9D2E-DCCB73A3C4A8}" type="datetimeFigureOut">
               <a:rPr lang="en-US" smtClean="0"/>
-              <a:t>11/27/2024</a:t>
+              <a:t>4/28/2025</a:t>
             </a:fld>
             <a:endParaRPr lang="en-US"/>
           </a:p>
@@ -1726,7 +1726,7 @@
           <a:p>
             <a:fld id="{ADCE79A2-4347-4199-9D2E-DCCB73A3C4A8}" type="datetimeFigureOut">
               <a:rPr lang="en-US" smtClean="0"/>
-              <a:t>11/27/2024</a:t>
+              <a:t>4/28/2025</a:t>
             </a:fld>
             <a:endParaRPr lang="en-US"/>
           </a:p>
@@ -1821,7 +1821,7 @@
           <a:p>
             <a:fld id="{ADCE79A2-4347-4199-9D2E-DCCB73A3C4A8}" type="datetimeFigureOut">
               <a:rPr lang="en-US" smtClean="0"/>
-              <a:t>11/27/2024</a:t>
+              <a:t>4/28/2025</a:t>
             </a:fld>
             <a:endParaRPr lang="en-US"/>
           </a:p>
@@ -2098,7 +2098,7 @@
           <a:p>
             <a:fld id="{ADCE79A2-4347-4199-9D2E-DCCB73A3C4A8}" type="datetimeFigureOut">
               <a:rPr lang="en-US" smtClean="0"/>
-              <a:t>11/27/2024</a:t>
+              <a:t>4/28/2025</a:t>
             </a:fld>
             <a:endParaRPr lang="en-US"/>
           </a:p>
@@ -2355,7 +2355,7 @@
           <a:p>
             <a:fld id="{ADCE79A2-4347-4199-9D2E-DCCB73A3C4A8}" type="datetimeFigureOut">
               <a:rPr lang="en-US" smtClean="0"/>
-              <a:t>11/27/2024</a:t>
+              <a:t>4/28/2025</a:t>
             </a:fld>
             <a:endParaRPr lang="en-US"/>
           </a:p>
@@ -2568,7 +2568,7 @@
           <a:p>
             <a:fld id="{ADCE79A2-4347-4199-9D2E-DCCB73A3C4A8}" type="datetimeFigureOut">
               <a:rPr lang="en-US" smtClean="0"/>
-              <a:t>11/27/2024</a:t>
+              <a:t>4/28/2025</a:t>
             </a:fld>
             <a:endParaRPr lang="en-US"/>
           </a:p>
@@ -2961,7 +2961,13 @@
   <p:cSld>
     <p:spTree>
       <p:nvGrpSpPr>
-        <p:cNvPr id="1" name=""/>
+        <p:cNvPr id="1" name="">
+          <a:extLst>
+            <a:ext uri="{FF2B5EF4-FFF2-40B4-BE49-F238E27FC236}">
+              <a16:creationId xmlns:a16="http://schemas.microsoft.com/office/drawing/2014/main" id="{4B8F9BBF-FCFB-3E14-0C0D-8D3E6D41341C}"/>
+            </a:ext>
+          </a:extLst>
+        </p:cNvPr>
         <p:cNvGrpSpPr/>
         <p:nvPr/>
       </p:nvGrpSpPr>
@@ -2978,7 +2984,7 @@
           <p:cNvPr id="2" name="Rectangle: Rounded Corners 1">
             <a:extLst>
               <a:ext uri="{FF2B5EF4-FFF2-40B4-BE49-F238E27FC236}">
-                <a16:creationId xmlns:a16="http://schemas.microsoft.com/office/drawing/2014/main" id="{A60ADA75-B102-F569-793F-3F10D5A586A7}"/>
+                <a16:creationId xmlns:a16="http://schemas.microsoft.com/office/drawing/2014/main" id="{DB6FF165-02BA-7B5C-27D8-D49DA7884A9B}"/>
               </a:ext>
             </a:extLst>
           </p:cNvPr>
@@ -2987,8 +2993,8 @@
         </p:nvSpPr>
         <p:spPr>
           <a:xfrm>
-            <a:off x="13308662" y="9850349"/>
-            <a:ext cx="11369252" cy="8939211"/>
+            <a:off x="12721176" y="10527257"/>
+            <a:ext cx="12395894" cy="7110446"/>
           </a:xfrm>
           <a:prstGeom prst="roundRect">
             <a:avLst>
@@ -3032,7 +3038,7 @@
           <p:cNvPr id="3" name="TextBox 2">
             <a:extLst>
               <a:ext uri="{FF2B5EF4-FFF2-40B4-BE49-F238E27FC236}">
-                <a16:creationId xmlns:a16="http://schemas.microsoft.com/office/drawing/2014/main" id="{CF366138-4DEA-9580-E2D4-C1C3DE94FEA6}"/>
+                <a16:creationId xmlns:a16="http://schemas.microsoft.com/office/drawing/2014/main" id="{FE69F16D-270C-8143-1A24-C5FFF408E346}"/>
               </a:ext>
             </a:extLst>
           </p:cNvPr>
@@ -3041,7 +3047,7 @@
         </p:nvSpPr>
         <p:spPr>
           <a:xfrm>
-            <a:off x="13454068" y="18975699"/>
+            <a:off x="13454068" y="17777671"/>
             <a:ext cx="12272510" cy="1569660"/>
           </a:xfrm>
           <a:prstGeom prst="rect">
@@ -3067,7 +3073,7 @@
           <p:cNvPr id="5" name="Rectangle: Rounded Corners 4">
             <a:extLst>
               <a:ext uri="{FF2B5EF4-FFF2-40B4-BE49-F238E27FC236}">
-                <a16:creationId xmlns:a16="http://schemas.microsoft.com/office/drawing/2014/main" id="{B875BFA2-20D6-B989-8CB4-901B4D69341E}"/>
+                <a16:creationId xmlns:a16="http://schemas.microsoft.com/office/drawing/2014/main" id="{7B2741C8-BFCC-0454-C81F-59C07D605E96}"/>
               </a:ext>
             </a:extLst>
           </p:cNvPr>
@@ -3121,7 +3127,7 @@
           <p:cNvPr id="1026" name="Picture 2" descr="Blind man - Free people icons">
             <a:extLst>
               <a:ext uri="{FF2B5EF4-FFF2-40B4-BE49-F238E27FC236}">
-                <a16:creationId xmlns:a16="http://schemas.microsoft.com/office/drawing/2014/main" id="{E3DC7D9E-205F-4071-A2EA-228B25C0C36B}"/>
+                <a16:creationId xmlns:a16="http://schemas.microsoft.com/office/drawing/2014/main" id="{F00A4415-C905-87E8-E2E4-79A88138BA6F}"/>
               </a:ext>
             </a:extLst>
           </p:cNvPr>
@@ -3166,7 +3172,7 @@
           <p:cNvPr id="1028" name="Picture 4" descr="Person Icon Images – Browse 7,012,491 Stock Photos, Vectors, and Video |  Adobe Stock">
             <a:extLst>
               <a:ext uri="{FF2B5EF4-FFF2-40B4-BE49-F238E27FC236}">
-                <a16:creationId xmlns:a16="http://schemas.microsoft.com/office/drawing/2014/main" id="{853E769A-13E8-30D3-295C-A90242607CA7}"/>
+                <a16:creationId xmlns:a16="http://schemas.microsoft.com/office/drawing/2014/main" id="{B2780BA5-59D6-E7F0-62A6-48AF33E5333A}"/>
               </a:ext>
             </a:extLst>
           </p:cNvPr>
@@ -3225,7 +3231,7 @@
           <p:cNvPr id="25" name="TextBox 24">
             <a:extLst>
               <a:ext uri="{FF2B5EF4-FFF2-40B4-BE49-F238E27FC236}">
-                <a16:creationId xmlns:a16="http://schemas.microsoft.com/office/drawing/2014/main" id="{3B549250-F533-6729-F345-4A1EDE76C6DB}"/>
+                <a16:creationId xmlns:a16="http://schemas.microsoft.com/office/drawing/2014/main" id="{57BD7705-CEE1-541A-3A25-BCDDCCDA81E9}"/>
               </a:ext>
             </a:extLst>
           </p:cNvPr>
@@ -3262,7 +3268,7 @@
           <p:cNvPr id="26" name="TextBox 25">
             <a:extLst>
               <a:ext uri="{FF2B5EF4-FFF2-40B4-BE49-F238E27FC236}">
-                <a16:creationId xmlns:a16="http://schemas.microsoft.com/office/drawing/2014/main" id="{39512557-EB16-B805-C459-20EBD5B92D8E}"/>
+                <a16:creationId xmlns:a16="http://schemas.microsoft.com/office/drawing/2014/main" id="{09C567A3-EBDB-F8CA-F71F-9248BCF69341}"/>
               </a:ext>
             </a:extLst>
           </p:cNvPr>
@@ -3299,7 +3305,7 @@
           <p:cNvPr id="27" name="TextBox 26">
             <a:extLst>
               <a:ext uri="{FF2B5EF4-FFF2-40B4-BE49-F238E27FC236}">
-                <a16:creationId xmlns:a16="http://schemas.microsoft.com/office/drawing/2014/main" id="{4C5D86A6-1CA1-393E-451F-17C4F06DDDE4}"/>
+                <a16:creationId xmlns:a16="http://schemas.microsoft.com/office/drawing/2014/main" id="{FF064463-5E27-841D-AD47-90B25909BA0D}"/>
               </a:ext>
             </a:extLst>
           </p:cNvPr>
@@ -3336,7 +3342,7 @@
           <p:cNvPr id="28" name="TextBox 27">
             <a:extLst>
               <a:ext uri="{FF2B5EF4-FFF2-40B4-BE49-F238E27FC236}">
-                <a16:creationId xmlns:a16="http://schemas.microsoft.com/office/drawing/2014/main" id="{EB40DA73-3F15-A6DF-3BFA-0B061D50B305}"/>
+                <a16:creationId xmlns:a16="http://schemas.microsoft.com/office/drawing/2014/main" id="{BFF1C275-F33A-537F-76E2-73FD15D33A0D}"/>
               </a:ext>
             </a:extLst>
           </p:cNvPr>
@@ -3372,7 +3378,7 @@
           <p:cNvPr id="29" name="TextBox 28">
             <a:extLst>
               <a:ext uri="{FF2B5EF4-FFF2-40B4-BE49-F238E27FC236}">
-                <a16:creationId xmlns:a16="http://schemas.microsoft.com/office/drawing/2014/main" id="{44F9808A-7395-765C-4CB7-DA09229A1879}"/>
+                <a16:creationId xmlns:a16="http://schemas.microsoft.com/office/drawing/2014/main" id="{825B9A49-269C-A165-93B2-0F592560E669}"/>
               </a:ext>
             </a:extLst>
           </p:cNvPr>
@@ -3409,7 +3415,7 @@
           <p:cNvPr id="30" name="TextBox 29">
             <a:extLst>
               <a:ext uri="{FF2B5EF4-FFF2-40B4-BE49-F238E27FC236}">
-                <a16:creationId xmlns:a16="http://schemas.microsoft.com/office/drawing/2014/main" id="{88451EB4-2216-1588-28A0-6EE5EAC3F014}"/>
+                <a16:creationId xmlns:a16="http://schemas.microsoft.com/office/drawing/2014/main" id="{1729A88B-5962-3ECC-E5CB-96D0732EC6C6}"/>
               </a:ext>
             </a:extLst>
           </p:cNvPr>
@@ -3445,7 +3451,7 @@
           <p:cNvPr id="31" name="TextBox 30">
             <a:extLst>
               <a:ext uri="{FF2B5EF4-FFF2-40B4-BE49-F238E27FC236}">
-                <a16:creationId xmlns:a16="http://schemas.microsoft.com/office/drawing/2014/main" id="{78D2A12B-2FF1-4875-2B26-60B3E8EE83DF}"/>
+                <a16:creationId xmlns:a16="http://schemas.microsoft.com/office/drawing/2014/main" id="{3385D15B-1249-51E0-6136-E72A4897C04E}"/>
               </a:ext>
             </a:extLst>
           </p:cNvPr>
@@ -3481,7 +3487,7 @@
           <p:cNvPr id="1030" name="Picture 6" descr="Page 14 | Pixel Browser icons for free download | Freepik">
             <a:extLst>
               <a:ext uri="{FF2B5EF4-FFF2-40B4-BE49-F238E27FC236}">
-                <a16:creationId xmlns:a16="http://schemas.microsoft.com/office/drawing/2014/main" id="{6CF49951-3BA2-D186-352C-E3C06543CF7F}"/>
+                <a16:creationId xmlns:a16="http://schemas.microsoft.com/office/drawing/2014/main" id="{52ED8A8D-A713-934D-CA42-09B008A19245}"/>
               </a:ext>
             </a:extLst>
           </p:cNvPr>
@@ -3528,7 +3534,7 @@
           <p:cNvPr id="1032" name="Picture 8" descr="New Mobile Phone icon | Freepik">
             <a:extLst>
               <a:ext uri="{FF2B5EF4-FFF2-40B4-BE49-F238E27FC236}">
-                <a16:creationId xmlns:a16="http://schemas.microsoft.com/office/drawing/2014/main" id="{E92E2325-8060-9449-CF3A-93C809238F68}"/>
+                <a16:creationId xmlns:a16="http://schemas.microsoft.com/office/drawing/2014/main" id="{1AE24C80-6C47-F351-8453-0CEDA9EF563B}"/>
               </a:ext>
             </a:extLst>
           </p:cNvPr>
@@ -3575,7 +3581,7 @@
           <p:cNvPr id="1034" name="Picture 10" descr="Database icon - Free download on Iconfinder">
             <a:extLst>
               <a:ext uri="{FF2B5EF4-FFF2-40B4-BE49-F238E27FC236}">
-                <a16:creationId xmlns:a16="http://schemas.microsoft.com/office/drawing/2014/main" id="{8B76FA96-E209-9917-4CE9-4B86249FCB2C}"/>
+                <a16:creationId xmlns:a16="http://schemas.microsoft.com/office/drawing/2014/main" id="{5D0CDA74-ED15-39DB-3DA5-67D467FEBC53}"/>
               </a:ext>
             </a:extLst>
           </p:cNvPr>
@@ -3622,7 +3628,7 @@
           <p:cNvPr id="1036" name="Picture 12" descr="web server icon for your website, mobile, presentation, and logo design.  21351649 Vector Art at Vecteezy">
             <a:extLst>
               <a:ext uri="{FF2B5EF4-FFF2-40B4-BE49-F238E27FC236}">
-                <a16:creationId xmlns:a16="http://schemas.microsoft.com/office/drawing/2014/main" id="{E1E51731-D4A4-815E-784C-B92563529BAC}"/>
+                <a16:creationId xmlns:a16="http://schemas.microsoft.com/office/drawing/2014/main" id="{8EC4F3C9-A37D-17E5-5DE1-A0A7E929CB61}"/>
               </a:ext>
             </a:extLst>
           </p:cNvPr>
@@ -3662,579 +3668,347 @@
           </a:extLst>
         </p:spPr>
       </p:pic>
-      <p:grpSp>
-        <p:nvGrpSpPr>
-          <p:cNvPr id="13" name="Group 12">
+      <p:pic>
+        <p:nvPicPr>
+          <p:cNvPr id="1038" name="Picture 14" descr="Chip, component, cpu, electrical, microcontroller icon - Download on  Iconfinder">
             <a:extLst>
               <a:ext uri="{FF2B5EF4-FFF2-40B4-BE49-F238E27FC236}">
-                <a16:creationId xmlns:a16="http://schemas.microsoft.com/office/drawing/2014/main" id="{7C10EE71-D09E-800A-B97E-F9D7FCBA85DF}"/>
+                <a16:creationId xmlns:a16="http://schemas.microsoft.com/office/drawing/2014/main" id="{1D6092EE-FC42-DAD0-8BB8-A542BCC67BF0}"/>
               </a:ext>
             </a:extLst>
           </p:cNvPr>
-          <p:cNvGrpSpPr/>
+          <p:cNvPicPr>
+            <a:picLocks noChangeAspect="1" noChangeArrowheads="1"/>
+          </p:cNvPicPr>
           <p:nvPr/>
-        </p:nvGrpSpPr>
-        <p:grpSpPr>
-          <a:xfrm>
-            <a:off x="13901323" y="14677839"/>
-            <a:ext cx="10158984" cy="3657600"/>
-            <a:chOff x="958781" y="13824014"/>
-            <a:chExt cx="10158984" cy="3657600"/>
-          </a:xfrm>
-        </p:grpSpPr>
-        <p:pic>
-          <p:nvPicPr>
-            <p:cNvPr id="1038" name="Picture 14" descr="Chip, component, cpu, electrical, microcontroller icon - Download on  Iconfinder">
-              <a:extLst>
-                <a:ext uri="{FF2B5EF4-FFF2-40B4-BE49-F238E27FC236}">
-                  <a16:creationId xmlns:a16="http://schemas.microsoft.com/office/drawing/2014/main" id="{AA0E8D61-5C34-0D98-8740-2B67149E7777}"/>
-                </a:ext>
-              </a:extLst>
-            </p:cNvPr>
-            <p:cNvPicPr>
-              <a:picLocks noChangeAspect="1" noChangeArrowheads="1"/>
-            </p:cNvPicPr>
-            <p:nvPr/>
-          </p:nvPicPr>
-          <p:blipFill>
-            <a:blip r:embed="rId9">
-              <a:extLst>
-                <a:ext uri="{28A0092B-C50C-407E-A947-70E740481C1C}">
-                  <a14:useLocalDpi xmlns:a14="http://schemas.microsoft.com/office/drawing/2010/main" val="0"/>
-                </a:ext>
-              </a:extLst>
-            </a:blip>
-            <a:srcRect/>
-            <a:stretch>
-              <a:fillRect/>
-            </a:stretch>
-          </p:blipFill>
-          <p:spPr bwMode="auto">
-            <a:xfrm>
-              <a:off x="1964988" y="14016519"/>
-              <a:ext cx="1905000" cy="1905000"/>
-            </a:xfrm>
-            <a:prstGeom prst="rect">
-              <a:avLst/>
-            </a:prstGeom>
-            <a:noFill/>
+        </p:nvPicPr>
+        <p:blipFill>
+          <a:blip r:embed="rId9">
             <a:extLst>
-              <a:ext uri="{909E8E84-426E-40DD-AFC4-6F175D3DCCD1}">
-                <a14:hiddenFill xmlns:a14="http://schemas.microsoft.com/office/drawing/2010/main">
-                  <a:solidFill>
-                    <a:srgbClr val="FFFFFF"/>
-                  </a:solidFill>
-                </a14:hiddenFill>
+              <a:ext uri="{28A0092B-C50C-407E-A947-70E740481C1C}">
+                <a14:useLocalDpi xmlns:a14="http://schemas.microsoft.com/office/drawing/2010/main" val="0"/>
               </a:ext>
             </a:extLst>
-          </p:spPr>
-        </p:pic>
-        <p:pic>
-          <p:nvPicPr>
-            <p:cNvPr id="1046" name="Picture 22" descr="vibration Icon - Free PNG &amp; SVG 4112216 - Noun Project">
-              <a:extLst>
-                <a:ext uri="{FF2B5EF4-FFF2-40B4-BE49-F238E27FC236}">
-                  <a16:creationId xmlns:a16="http://schemas.microsoft.com/office/drawing/2014/main" id="{45A12F80-2450-2AE5-64EC-9D4C09C95F2C}"/>
-                </a:ext>
-              </a:extLst>
-            </p:cNvPr>
-            <p:cNvPicPr>
-              <a:picLocks noChangeAspect="1" noChangeArrowheads="1"/>
-            </p:cNvPicPr>
-            <p:nvPr/>
-          </p:nvPicPr>
-          <p:blipFill>
-            <a:blip r:embed="rId10">
-              <a:extLst>
-                <a:ext uri="{28A0092B-C50C-407E-A947-70E740481C1C}">
-                  <a14:useLocalDpi xmlns:a14="http://schemas.microsoft.com/office/drawing/2010/main" val="0"/>
-                </a:ext>
-              </a:extLst>
-            </a:blip>
-            <a:srcRect/>
-            <a:stretch>
-              <a:fillRect/>
-            </a:stretch>
-          </p:blipFill>
-          <p:spPr bwMode="auto">
-            <a:xfrm>
-              <a:off x="7297701" y="14039026"/>
-              <a:ext cx="2167663" cy="2167663"/>
-            </a:xfrm>
-            <a:prstGeom prst="rect">
-              <a:avLst/>
-            </a:prstGeom>
-            <a:noFill/>
-            <a:extLst>
-              <a:ext uri="{909E8E84-426E-40DD-AFC4-6F175D3DCCD1}">
-                <a14:hiddenFill xmlns:a14="http://schemas.microsoft.com/office/drawing/2010/main">
-                  <a:solidFill>
-                    <a:srgbClr val="FFFFFF"/>
-                  </a:solidFill>
-                </a14:hiddenFill>
-              </a:ext>
-            </a:extLst>
-          </p:spPr>
-        </p:pic>
-        <p:sp>
-          <p:nvSpPr>
-            <p:cNvPr id="7" name="TextBox 6">
-              <a:extLst>
-                <a:ext uri="{FF2B5EF4-FFF2-40B4-BE49-F238E27FC236}">
-                  <a16:creationId xmlns:a16="http://schemas.microsoft.com/office/drawing/2014/main" id="{3DFE9FB8-6D3B-5577-AE0A-025185FF071B}"/>
-                </a:ext>
-              </a:extLst>
-            </p:cNvPr>
-            <p:cNvSpPr txBox="1"/>
-            <p:nvPr/>
-          </p:nvSpPr>
-          <p:spPr>
-            <a:xfrm>
-              <a:off x="6450817" y="16285271"/>
-              <a:ext cx="4550615" cy="769441"/>
-            </a:xfrm>
-            <a:prstGeom prst="rect">
-              <a:avLst/>
-            </a:prstGeom>
-            <a:noFill/>
-          </p:spPr>
-          <p:txBody>
-            <a:bodyPr wrap="square" rtlCol="0">
-              <a:spAutoFit/>
-            </a:bodyPr>
-            <a:lstStyle/>
-            <a:p>
-              <a:r>
-                <a:rPr lang="en-US" sz="4400" b="1" dirty="0"/>
-                <a:t>Vibration Motor</a:t>
-              </a:r>
-            </a:p>
-          </p:txBody>
-        </p:sp>
-        <p:sp>
-          <p:nvSpPr>
-            <p:cNvPr id="11" name="TextBox 10">
-              <a:extLst>
-                <a:ext uri="{FF2B5EF4-FFF2-40B4-BE49-F238E27FC236}">
-                  <a16:creationId xmlns:a16="http://schemas.microsoft.com/office/drawing/2014/main" id="{6AE407A7-26C3-CD58-1301-84F9670ADE7F}"/>
-                </a:ext>
-              </a:extLst>
-            </p:cNvPr>
-            <p:cNvSpPr txBox="1"/>
-            <p:nvPr/>
-          </p:nvSpPr>
-          <p:spPr>
-            <a:xfrm>
-              <a:off x="2139352" y="16285272"/>
-              <a:ext cx="1837364" cy="769441"/>
-            </a:xfrm>
-            <a:prstGeom prst="rect">
-              <a:avLst/>
-            </a:prstGeom>
-            <a:noFill/>
-          </p:spPr>
-          <p:txBody>
-            <a:bodyPr wrap="square" rtlCol="0">
-              <a:spAutoFit/>
-            </a:bodyPr>
-            <a:lstStyle/>
-            <a:p>
-              <a:r>
-                <a:rPr lang="en-US" sz="4400" b="1" dirty="0"/>
-                <a:t>MCU</a:t>
-              </a:r>
-            </a:p>
-          </p:txBody>
-        </p:sp>
-        <p:sp>
-          <p:nvSpPr>
-            <p:cNvPr id="12" name="Rectangle: Rounded Corners 11">
-              <a:extLst>
-                <a:ext uri="{FF2B5EF4-FFF2-40B4-BE49-F238E27FC236}">
-                  <a16:creationId xmlns:a16="http://schemas.microsoft.com/office/drawing/2014/main" id="{93D1CC3B-8835-2386-9915-5C0E447850C2}"/>
-                </a:ext>
-              </a:extLst>
-            </p:cNvPr>
-            <p:cNvSpPr/>
-            <p:nvPr/>
-          </p:nvSpPr>
-          <p:spPr>
-            <a:xfrm>
-              <a:off x="958781" y="13824014"/>
-              <a:ext cx="10158984" cy="3657600"/>
-            </a:xfrm>
-            <a:prstGeom prst="roundRect">
-              <a:avLst>
-                <a:gd name="adj" fmla="val 13263"/>
-              </a:avLst>
-            </a:prstGeom>
-            <a:noFill/>
-            <a:ln w="73025">
-              <a:solidFill>
-                <a:schemeClr val="tx1"/>
-              </a:solidFill>
-            </a:ln>
-          </p:spPr>
-          <p:style>
-            <a:lnRef idx="2">
-              <a:schemeClr val="accent1">
-                <a:shade val="15000"/>
-              </a:schemeClr>
-            </a:lnRef>
-            <a:fillRef idx="1">
-              <a:schemeClr val="accent1"/>
-            </a:fillRef>
-            <a:effectRef idx="0">
-              <a:schemeClr val="accent1"/>
-            </a:effectRef>
-            <a:fontRef idx="minor">
-              <a:schemeClr val="lt1"/>
-            </a:fontRef>
-          </p:style>
-          <p:txBody>
-            <a:bodyPr rtlCol="0" anchor="ctr"/>
-            <a:lstStyle/>
-            <a:p>
-              <a:pPr algn="ctr"/>
-              <a:endParaRPr lang="en-US"/>
-            </a:p>
-          </p:txBody>
-        </p:sp>
-      </p:grpSp>
-      <p:grpSp>
-        <p:nvGrpSpPr>
-          <p:cNvPr id="16" name="Group 15">
+          </a:blip>
+          <a:srcRect/>
+          <a:stretch>
+            <a:fillRect/>
+          </a:stretch>
+        </p:blipFill>
+        <p:spPr bwMode="auto">
+          <a:xfrm>
+            <a:off x="14258694" y="12740416"/>
+            <a:ext cx="2337747" cy="2337747"/>
+          </a:xfrm>
+          <a:prstGeom prst="rect">
+            <a:avLst/>
+          </a:prstGeom>
+          <a:noFill/>
+          <a:extLst>
+            <a:ext uri="{909E8E84-426E-40DD-AFC4-6F175D3DCCD1}">
+              <a14:hiddenFill xmlns:a14="http://schemas.microsoft.com/office/drawing/2010/main">
+                <a:solidFill>
+                  <a:srgbClr val="FFFFFF"/>
+                </a:solidFill>
+              </a14:hiddenFill>
+            </a:ext>
+          </a:extLst>
+        </p:spPr>
+      </p:pic>
+      <p:pic>
+        <p:nvPicPr>
+          <p:cNvPr id="1046" name="Picture 22" descr="vibration Icon - Free PNG &amp; SVG 4112216 - Noun Project">
             <a:extLst>
               <a:ext uri="{FF2B5EF4-FFF2-40B4-BE49-F238E27FC236}">
-                <a16:creationId xmlns:a16="http://schemas.microsoft.com/office/drawing/2014/main" id="{A68E11AE-53B9-64B8-1E83-8A671326779C}"/>
+                <a16:creationId xmlns:a16="http://schemas.microsoft.com/office/drawing/2014/main" id="{A4B01ACC-6C99-84EE-AF6D-243E4DE8413E}"/>
               </a:ext>
             </a:extLst>
           </p:cNvPr>
-          <p:cNvGrpSpPr/>
+          <p:cNvPicPr>
+            <a:picLocks noChangeAspect="1" noChangeArrowheads="1"/>
+          </p:cNvPicPr>
           <p:nvPr/>
-        </p:nvGrpSpPr>
-        <p:grpSpPr>
-          <a:xfrm>
-            <a:off x="13903832" y="10428838"/>
-            <a:ext cx="10160949" cy="3657489"/>
-            <a:chOff x="7325712" y="13584046"/>
-            <a:chExt cx="10160949" cy="3657489"/>
-          </a:xfrm>
-        </p:grpSpPr>
-        <p:pic>
-          <p:nvPicPr>
-            <p:cNvPr id="1048" name="Picture 24" descr="Ultrasonic Sensors | Hans TURCK GmbH Co. KG">
-              <a:extLst>
-                <a:ext uri="{FF2B5EF4-FFF2-40B4-BE49-F238E27FC236}">
-                  <a16:creationId xmlns:a16="http://schemas.microsoft.com/office/drawing/2014/main" id="{4C924DD5-AF65-9C4D-262F-0A02A297B573}"/>
-                </a:ext>
-              </a:extLst>
-            </p:cNvPr>
-            <p:cNvPicPr>
-              <a:picLocks noChangeAspect="1" noChangeArrowheads="1"/>
-            </p:cNvPicPr>
-            <p:nvPr/>
-          </p:nvPicPr>
-          <p:blipFill rotWithShape="1">
-            <a:blip r:embed="rId11">
-              <a:extLst>
-                <a:ext uri="{BEBA8EAE-BF5A-486C-A8C5-ECC9F3942E4B}">
-                  <a14:imgProps xmlns:a14="http://schemas.microsoft.com/office/drawing/2010/main">
-                    <a14:imgLayer r:embed="rId12">
-                      <a14:imgEffect>
-                        <a14:backgroundRemoval t="9809" b="89713" l="5742" r="95455">
-                          <a14:foregroundMark x1="20096" y1="47129" x2="20096" y2="47129"/>
-                          <a14:foregroundMark x1="26077" y1="48086" x2="23923" y2="48804"/>
-                          <a14:foregroundMark x1="27273" y1="48325" x2="12201" y2="44976"/>
-                          <a14:foregroundMark x1="12201" y1="44976" x2="5742" y2="53589"/>
-                          <a14:foregroundMark x1="5742" y1="53589" x2="18222" y2="57447"/>
-                          <a14:foregroundMark x1="19254" y1="57188" x2="26316" y2="47847"/>
-                          <a14:foregroundMark x1="26316" y1="47847" x2="24589" y2="45343"/>
-                          <a14:foregroundMark x1="18132" y1="42396" x2="17703" y2="42584"/>
-                          <a14:foregroundMark x1="33656" y1="54785" x2="33732" y2="55263"/>
-                          <a14:foregroundMark x1="33505" y1="53828" x2="33656" y2="54785"/>
-                          <a14:foregroundMark x1="33460" y1="53540" x2="33505" y2="53828"/>
-                          <a14:foregroundMark x1="32297" y1="46172" x2="32483" y2="47348"/>
-                          <a14:foregroundMark x1="33732" y1="55263" x2="33732" y2="55456"/>
-                          <a14:foregroundMark x1="49522" y1="38517" x2="54067" y2="43780"/>
-                          <a14:foregroundMark x1="53589" y1="46651" x2="54545" y2="53110"/>
-                          <a14:foregroundMark x1="54067" y1="55981" x2="52392" y2="60048"/>
-                          <a14:foregroundMark x1="61244" y1="35167" x2="66507" y2="40431"/>
-                          <a14:foregroundMark x1="75120" y1="34928" x2="75120" y2="34928"/>
-                          <a14:foregroundMark x1="84689" y1="36603" x2="84689" y2="36603"/>
-                          <a14:foregroundMark x1="88517" y1="30144" x2="88278" y2="39952"/>
-                          <a14:foregroundMark x1="88278" y1="39952" x2="85885" y2="31818"/>
-                          <a14:foregroundMark x1="85646" y1="24402" x2="93541" y2="29426"/>
-                          <a14:foregroundMark x1="95391" y1="56938" x2="95439" y2="57658"/>
-                          <a14:foregroundMark x1="95375" y1="56699" x2="95391" y2="56938"/>
-                          <a14:foregroundMark x1="95311" y1="55742" x2="95375" y2="56699"/>
-                          <a14:foregroundMark x1="95247" y1="54785" x2="95311" y2="55742"/>
-                          <a14:foregroundMark x1="95135" y1="53118" x2="95247" y2="54785"/>
-                          <a14:foregroundMark x1="93541" y1="29426" x2="94954" y2="50429"/>
-                          <a14:foregroundMark x1="95029" y1="59201" x2="88038" y2="80622"/>
-                          <a14:foregroundMark x1="88038" y1="80622" x2="88038" y2="25120"/>
-                          <a14:foregroundMark x1="32521" y1="47344" x2="32775" y2="45215"/>
-                          <a14:foregroundMark x1="32775" y1="45215" x2="33493" y2="45215"/>
-                          <a14:foregroundMark x1="41627" y1="57177" x2="44019" y2="49761"/>
-                          <a14:foregroundMark x1="32919" y1="54785" x2="33254" y2="54306"/>
-                          <a14:foregroundMark x1="32206" y1="55803" x2="32919" y2="54785"/>
-                          <a14:foregroundMark x1="31579" y1="56699" x2="32102" y2="55952"/>
-                          <a14:foregroundMark x1="32279" y1="56030" x2="33732" y2="54785"/>
-                          <a14:foregroundMark x1="32057" y1="56220" x2="32159" y2="56132"/>
-                          <a14:foregroundMark x1="30622" y1="54785" x2="30622" y2="54785"/>
-                          <a14:foregroundMark x1="31995" y1="48325" x2="32057" y2="47368"/>
-                          <a14:foregroundMark x1="31918" y1="49522" x2="31995" y2="48325"/>
-                          <a14:foregroundMark x1="31817" y1="51085" x2="31918" y2="49522"/>
-                          <a14:foregroundMark x1="31579" y1="54785" x2="31707" y2="52802"/>
-                          <a14:backgroundMark x1="21531" y1="41148" x2="21531" y2="41148"/>
-                          <a14:backgroundMark x1="24163" y1="41866" x2="17943" y2="42105"/>
-                          <a14:backgroundMark x1="32297" y1="50478" x2="32775" y2="50478"/>
-                          <a14:backgroundMark x1="32057" y1="48325" x2="30861" y2="52871"/>
-                          <a14:backgroundMark x1="32057" y1="48804" x2="32536" y2="50957"/>
-                          <a14:backgroundMark x1="32057" y1="48565" x2="32057" y2="48565"/>
-                          <a14:backgroundMark x1="32297" y1="47368" x2="32536" y2="49522"/>
-                          <a14:backgroundMark x1="32057" y1="53349" x2="32057" y2="53349"/>
-                          <a14:backgroundMark x1="33493" y1="57177" x2="33493" y2="57177"/>
-                          <a14:backgroundMark x1="34211" y1="56220" x2="33254" y2="57177"/>
-                          <a14:backgroundMark x1="31818" y1="53828" x2="31818" y2="53828"/>
-                          <a14:backgroundMark x1="31579" y1="53589" x2="31579" y2="53589"/>
-                          <a14:backgroundMark x1="33971" y1="55742" x2="33172" y2="56061"/>
-                          <a14:backgroundMark x1="31100" y1="53110" x2="31340" y2="53349"/>
-                          <a14:backgroundMark x1="19856" y1="58134" x2="18660" y2="58134"/>
-                          <a14:backgroundMark x1="96651" y1="60048" x2="96172" y2="55981"/>
-                          <a14:backgroundMark x1="95455" y1="57895" x2="95455" y2="57895"/>
-                          <a14:backgroundMark x1="95694" y1="56699" x2="95694" y2="56699"/>
-                          <a14:backgroundMark x1="95694" y1="55742" x2="95694" y2="55742"/>
-                          <a14:backgroundMark x1="95455" y1="54785" x2="95455" y2="54785"/>
-                          <a14:backgroundMark x1="95455" y1="56938" x2="95455" y2="56938"/>
-                          <a14:backgroundMark x1="95455" y1="57656" x2="95694" y2="59091"/>
-                          <a14:backgroundMark x1="95455" y1="60287" x2="95215" y2="50957"/>
-                          <a14:backgroundMark x1="95455" y1="50239" x2="96411" y2="52632"/>
-                          <a14:backgroundMark x1="32057" y1="49522" x2="32057" y2="49522"/>
-                          <a14:backgroundMark x1="31579" y1="48325" x2="31579" y2="48325"/>
-                          <a14:backgroundMark x1="32057" y1="51196" x2="31340" y2="52632"/>
-                          <a14:backgroundMark x1="31818" y1="50000" x2="31818" y2="51196"/>
-                          <a14:backgroundMark x1="31579" y1="48086" x2="31579" y2="47129"/>
-                          <a14:backgroundMark x1="29904" y1="54785" x2="29904" y2="54785"/>
-                          <a14:backgroundMark x1="30383" y1="54785" x2="30383" y2="54785"/>
-                          <a14:backgroundMark x1="33254" y1="59569" x2="33254" y2="59091"/>
-                          <a14:backgroundMark x1="33014" y1="58612" x2="33014" y2="58612"/>
-                          <a14:backgroundMark x1="32057" y1="57895" x2="32057" y2="57895"/>
-                          <a14:backgroundMark x1="32775" y1="57895" x2="31100" y2="59569"/>
-                        </a14:backgroundRemoval>
-                      </a14:imgEffect>
-                      <a14:imgEffect>
-                        <a14:saturation sat="0"/>
-                      </a14:imgEffect>
-                    </a14:imgLayer>
-                  </a14:imgProps>
-                </a:ext>
-                <a:ext uri="{28A0092B-C50C-407E-A947-70E740481C1C}">
-                  <a14:useLocalDpi xmlns:a14="http://schemas.microsoft.com/office/drawing/2010/main" val="0"/>
-                </a:ext>
-              </a:extLst>
-            </a:blip>
-            <a:srcRect t="15187" b="18806"/>
-            <a:stretch/>
-          </p:blipFill>
-          <p:spPr bwMode="auto">
-            <a:xfrm>
-              <a:off x="13265771" y="14175558"/>
-              <a:ext cx="2632201" cy="1737454"/>
-            </a:xfrm>
-            <a:prstGeom prst="rect">
-              <a:avLst/>
-            </a:prstGeom>
-            <a:noFill/>
+        </p:nvPicPr>
+        <p:blipFill>
+          <a:blip r:embed="rId10">
             <a:extLst>
-              <a:ext uri="{909E8E84-426E-40DD-AFC4-6F175D3DCCD1}">
-                <a14:hiddenFill xmlns:a14="http://schemas.microsoft.com/office/drawing/2010/main">
-                  <a:solidFill>
-                    <a:srgbClr val="FFFFFF"/>
-                  </a:solidFill>
-                </a14:hiddenFill>
+              <a:ext uri="{28A0092B-C50C-407E-A947-70E740481C1C}">
+                <a14:useLocalDpi xmlns:a14="http://schemas.microsoft.com/office/drawing/2010/main" val="0"/>
               </a:ext>
             </a:extLst>
-          </p:spPr>
-        </p:pic>
-        <p:pic>
-          <p:nvPicPr>
-            <p:cNvPr id="4" name="Picture 14" descr="Chip, component, cpu, electrical, microcontroller icon - Download on  Iconfinder">
-              <a:extLst>
-                <a:ext uri="{FF2B5EF4-FFF2-40B4-BE49-F238E27FC236}">
-                  <a16:creationId xmlns:a16="http://schemas.microsoft.com/office/drawing/2014/main" id="{2EF204DF-F686-3BD4-C93B-A86CCB57692A}"/>
-                </a:ext>
-              </a:extLst>
-            </p:cNvPr>
-            <p:cNvPicPr>
-              <a:picLocks noChangeAspect="1" noChangeArrowheads="1"/>
-            </p:cNvPicPr>
-            <p:nvPr/>
-          </p:nvPicPr>
-          <p:blipFill>
-            <a:blip r:embed="rId9">
-              <a:extLst>
-                <a:ext uri="{28A0092B-C50C-407E-A947-70E740481C1C}">
-                  <a14:useLocalDpi xmlns:a14="http://schemas.microsoft.com/office/drawing/2010/main" val="0"/>
-                </a:ext>
-              </a:extLst>
-            </a:blip>
-            <a:srcRect/>
-            <a:stretch>
-              <a:fillRect/>
-            </a:stretch>
-          </p:blipFill>
-          <p:spPr bwMode="auto">
-            <a:xfrm>
-              <a:off x="7937579" y="14066345"/>
-              <a:ext cx="1905000" cy="1905000"/>
-            </a:xfrm>
-            <a:prstGeom prst="rect">
-              <a:avLst/>
-            </a:prstGeom>
-            <a:noFill/>
+          </a:blip>
+          <a:srcRect/>
+          <a:stretch>
+            <a:fillRect/>
+          </a:stretch>
+        </p:blipFill>
+        <p:spPr bwMode="auto">
+          <a:xfrm>
+            <a:off x="21067243" y="14093671"/>
+            <a:ext cx="2167663" cy="2167663"/>
+          </a:xfrm>
+          <a:prstGeom prst="rect">
+            <a:avLst/>
+          </a:prstGeom>
+          <a:noFill/>
+          <a:extLst>
+            <a:ext uri="{909E8E84-426E-40DD-AFC4-6F175D3DCCD1}">
+              <a14:hiddenFill xmlns:a14="http://schemas.microsoft.com/office/drawing/2010/main">
+                <a:solidFill>
+                  <a:srgbClr val="FFFFFF"/>
+                </a:solidFill>
+              </a14:hiddenFill>
+            </a:ext>
+          </a:extLst>
+        </p:spPr>
+      </p:pic>
+      <p:sp>
+        <p:nvSpPr>
+          <p:cNvPr id="7" name="TextBox 6">
             <a:extLst>
-              <a:ext uri="{909E8E84-426E-40DD-AFC4-6F175D3DCCD1}">
-                <a14:hiddenFill xmlns:a14="http://schemas.microsoft.com/office/drawing/2010/main">
-                  <a:solidFill>
-                    <a:srgbClr val="FFFFFF"/>
-                  </a:solidFill>
-                </a14:hiddenFill>
+              <a:ext uri="{FF2B5EF4-FFF2-40B4-BE49-F238E27FC236}">
+                <a16:creationId xmlns:a16="http://schemas.microsoft.com/office/drawing/2014/main" id="{11CF0C3D-4165-4119-64B6-A3ED1294876E}"/>
               </a:ext>
             </a:extLst>
-          </p:spPr>
-        </p:pic>
-        <p:sp>
-          <p:nvSpPr>
-            <p:cNvPr id="6" name="TextBox 5">
-              <a:extLst>
-                <a:ext uri="{FF2B5EF4-FFF2-40B4-BE49-F238E27FC236}">
-                  <a16:creationId xmlns:a16="http://schemas.microsoft.com/office/drawing/2014/main" id="{81548A91-8562-F06E-F215-BE19AD265B7D}"/>
-                </a:ext>
-              </a:extLst>
-            </p:cNvPr>
-            <p:cNvSpPr txBox="1"/>
-            <p:nvPr/>
-          </p:nvSpPr>
-          <p:spPr>
-            <a:xfrm>
-              <a:off x="12716131" y="16158570"/>
-              <a:ext cx="4550615" cy="769441"/>
-            </a:xfrm>
-            <a:prstGeom prst="rect">
-              <a:avLst/>
-            </a:prstGeom>
-            <a:noFill/>
-          </p:spPr>
-          <p:txBody>
-            <a:bodyPr wrap="square" rtlCol="0">
-              <a:spAutoFit/>
-            </a:bodyPr>
-            <a:lstStyle/>
-            <a:p>
-              <a:r>
-                <a:rPr lang="en-US" sz="4400" b="1" dirty="0"/>
-                <a:t>Proximity Sensor</a:t>
-              </a:r>
-            </a:p>
-          </p:txBody>
-        </p:sp>
-        <p:sp>
-          <p:nvSpPr>
-            <p:cNvPr id="9" name="TextBox 8">
-              <a:extLst>
-                <a:ext uri="{FF2B5EF4-FFF2-40B4-BE49-F238E27FC236}">
-                  <a16:creationId xmlns:a16="http://schemas.microsoft.com/office/drawing/2014/main" id="{59326847-A955-D3BE-7FC8-8B48DA9F4566}"/>
-                </a:ext>
-              </a:extLst>
-            </p:cNvPr>
-            <p:cNvSpPr txBox="1"/>
-            <p:nvPr/>
-          </p:nvSpPr>
-          <p:spPr>
-            <a:xfrm>
-              <a:off x="8180399" y="16157484"/>
-              <a:ext cx="1837364" cy="769441"/>
-            </a:xfrm>
-            <a:prstGeom prst="rect">
-              <a:avLst/>
-            </a:prstGeom>
-            <a:noFill/>
-          </p:spPr>
-          <p:txBody>
-            <a:bodyPr wrap="square" rtlCol="0">
-              <a:spAutoFit/>
-            </a:bodyPr>
-            <a:lstStyle/>
-            <a:p>
-              <a:r>
-                <a:rPr lang="en-US" sz="4400" b="1" dirty="0"/>
-                <a:t>MCU</a:t>
-              </a:r>
-            </a:p>
-          </p:txBody>
-        </p:sp>
-        <p:sp>
-          <p:nvSpPr>
-            <p:cNvPr id="15" name="Rectangle: Rounded Corners 14">
-              <a:extLst>
-                <a:ext uri="{FF2B5EF4-FFF2-40B4-BE49-F238E27FC236}">
-                  <a16:creationId xmlns:a16="http://schemas.microsoft.com/office/drawing/2014/main" id="{5C03A4F1-7D09-CBC8-B14E-98B31D21ACCD}"/>
-                </a:ext>
-              </a:extLst>
-            </p:cNvPr>
-            <p:cNvSpPr/>
-            <p:nvPr/>
-          </p:nvSpPr>
-          <p:spPr>
-            <a:xfrm>
-              <a:off x="7325712" y="13584046"/>
-              <a:ext cx="10160949" cy="3657489"/>
-            </a:xfrm>
-            <a:prstGeom prst="roundRect">
-              <a:avLst>
-                <a:gd name="adj" fmla="val 13263"/>
-              </a:avLst>
-            </a:prstGeom>
-            <a:noFill/>
-            <a:ln w="73025">
-              <a:solidFill>
-                <a:schemeClr val="tx1"/>
-              </a:solidFill>
-            </a:ln>
-          </p:spPr>
-          <p:style>
-            <a:lnRef idx="2">
-              <a:schemeClr val="accent1">
-                <a:shade val="15000"/>
-              </a:schemeClr>
-            </a:lnRef>
-            <a:fillRef idx="1">
-              <a:schemeClr val="accent1"/>
-            </a:fillRef>
-            <a:effectRef idx="0">
-              <a:schemeClr val="accent1"/>
-            </a:effectRef>
-            <a:fontRef idx="minor">
-              <a:schemeClr val="lt1"/>
-            </a:fontRef>
-          </p:style>
-          <p:txBody>
-            <a:bodyPr rtlCol="0" anchor="ctr"/>
-            <a:lstStyle/>
-            <a:p>
-              <a:pPr algn="ctr"/>
-              <a:endParaRPr lang="en-US"/>
-            </a:p>
-          </p:txBody>
-        </p:sp>
-      </p:grpSp>
+          </p:cNvPr>
+          <p:cNvSpPr txBox="1"/>
+          <p:nvPr/>
+        </p:nvSpPr>
+        <p:spPr>
+          <a:xfrm>
+            <a:off x="20047717" y="16357932"/>
+            <a:ext cx="4550615" cy="769441"/>
+          </a:xfrm>
+          <a:prstGeom prst="rect">
+            <a:avLst/>
+          </a:prstGeom>
+          <a:noFill/>
+        </p:spPr>
+        <p:txBody>
+          <a:bodyPr wrap="square" rtlCol="0">
+            <a:spAutoFit/>
+          </a:bodyPr>
+          <a:lstStyle/>
+          <a:p>
+            <a:r>
+              <a:rPr lang="en-US" sz="4400" b="1" dirty="0"/>
+              <a:t>Vibration Motor</a:t>
+            </a:r>
+          </a:p>
+        </p:txBody>
+      </p:sp>
+      <p:sp>
+        <p:nvSpPr>
+          <p:cNvPr id="11" name="TextBox 10">
+            <a:extLst>
+              <a:ext uri="{FF2B5EF4-FFF2-40B4-BE49-F238E27FC236}">
+                <a16:creationId xmlns:a16="http://schemas.microsoft.com/office/drawing/2014/main" id="{151422EF-AD21-9451-20DF-67F68540C9D0}"/>
+              </a:ext>
+            </a:extLst>
+          </p:cNvPr>
+          <p:cNvSpPr txBox="1"/>
+          <p:nvPr/>
+        </p:nvSpPr>
+        <p:spPr>
+          <a:xfrm>
+            <a:off x="14790821" y="15532378"/>
+            <a:ext cx="1837364" cy="769441"/>
+          </a:xfrm>
+          <a:prstGeom prst="rect">
+            <a:avLst/>
+          </a:prstGeom>
+          <a:noFill/>
+        </p:spPr>
+        <p:txBody>
+          <a:bodyPr wrap="square" rtlCol="0">
+            <a:spAutoFit/>
+          </a:bodyPr>
+          <a:lstStyle/>
+          <a:p>
+            <a:r>
+              <a:rPr lang="en-US" sz="4400" b="1" dirty="0"/>
+              <a:t>MCU</a:t>
+            </a:r>
+          </a:p>
+        </p:txBody>
+      </p:sp>
+      <p:pic>
+        <p:nvPicPr>
+          <p:cNvPr id="1048" name="Picture 24" descr="Ultrasonic Sensors | Hans TURCK GmbH Co. KG">
+            <a:extLst>
+              <a:ext uri="{FF2B5EF4-FFF2-40B4-BE49-F238E27FC236}">
+                <a16:creationId xmlns:a16="http://schemas.microsoft.com/office/drawing/2014/main" id="{E9C3B715-4B8E-04B8-2380-FCF631F670DC}"/>
+              </a:ext>
+            </a:extLst>
+          </p:cNvPr>
+          <p:cNvPicPr>
+            <a:picLocks noChangeAspect="1" noChangeArrowheads="1"/>
+          </p:cNvPicPr>
+          <p:nvPr/>
+        </p:nvPicPr>
+        <p:blipFill rotWithShape="1">
+          <a:blip r:embed="rId11">
+            <a:extLst>
+              <a:ext uri="{BEBA8EAE-BF5A-486C-A8C5-ECC9F3942E4B}">
+                <a14:imgProps xmlns:a14="http://schemas.microsoft.com/office/drawing/2010/main">
+                  <a14:imgLayer r:embed="rId12">
+                    <a14:imgEffect>
+                      <a14:backgroundRemoval t="9809" b="89713" l="5742" r="95455">
+                        <a14:foregroundMark x1="20096" y1="47129" x2="20096" y2="47129"/>
+                        <a14:foregroundMark x1="26077" y1="48086" x2="23923" y2="48804"/>
+                        <a14:foregroundMark x1="27273" y1="48325" x2="12201" y2="44976"/>
+                        <a14:foregroundMark x1="12201" y1="44976" x2="5742" y2="53589"/>
+                        <a14:foregroundMark x1="5742" y1="53589" x2="18222" y2="57447"/>
+                        <a14:foregroundMark x1="19254" y1="57188" x2="26316" y2="47847"/>
+                        <a14:foregroundMark x1="26316" y1="47847" x2="24589" y2="45343"/>
+                        <a14:foregroundMark x1="18132" y1="42396" x2="17703" y2="42584"/>
+                        <a14:foregroundMark x1="33656" y1="54785" x2="33732" y2="55263"/>
+                        <a14:foregroundMark x1="33505" y1="53828" x2="33656" y2="54785"/>
+                        <a14:foregroundMark x1="33460" y1="53540" x2="33505" y2="53828"/>
+                        <a14:foregroundMark x1="32297" y1="46172" x2="32483" y2="47348"/>
+                        <a14:foregroundMark x1="33732" y1="55263" x2="33732" y2="55456"/>
+                        <a14:foregroundMark x1="49522" y1="38517" x2="54067" y2="43780"/>
+                        <a14:foregroundMark x1="53589" y1="46651" x2="54545" y2="53110"/>
+                        <a14:foregroundMark x1="54067" y1="55981" x2="52392" y2="60048"/>
+                        <a14:foregroundMark x1="61244" y1="35167" x2="66507" y2="40431"/>
+                        <a14:foregroundMark x1="75120" y1="34928" x2="75120" y2="34928"/>
+                        <a14:foregroundMark x1="84689" y1="36603" x2="84689" y2="36603"/>
+                        <a14:foregroundMark x1="88517" y1="30144" x2="88278" y2="39952"/>
+                        <a14:foregroundMark x1="88278" y1="39952" x2="85885" y2="31818"/>
+                        <a14:foregroundMark x1="85646" y1="24402" x2="93541" y2="29426"/>
+                        <a14:foregroundMark x1="95391" y1="56938" x2="95439" y2="57658"/>
+                        <a14:foregroundMark x1="95375" y1="56699" x2="95391" y2="56938"/>
+                        <a14:foregroundMark x1="95311" y1="55742" x2="95375" y2="56699"/>
+                        <a14:foregroundMark x1="95247" y1="54785" x2="95311" y2="55742"/>
+                        <a14:foregroundMark x1="95135" y1="53118" x2="95247" y2="54785"/>
+                        <a14:foregroundMark x1="93541" y1="29426" x2="94954" y2="50429"/>
+                        <a14:foregroundMark x1="95029" y1="59201" x2="88038" y2="80622"/>
+                        <a14:foregroundMark x1="88038" y1="80622" x2="88038" y2="25120"/>
+                        <a14:foregroundMark x1="32521" y1="47344" x2="32775" y2="45215"/>
+                        <a14:foregroundMark x1="32775" y1="45215" x2="33493" y2="45215"/>
+                        <a14:foregroundMark x1="41627" y1="57177" x2="44019" y2="49761"/>
+                        <a14:foregroundMark x1="32919" y1="54785" x2="33254" y2="54306"/>
+                        <a14:foregroundMark x1="32206" y1="55803" x2="32919" y2="54785"/>
+                        <a14:foregroundMark x1="31579" y1="56699" x2="32102" y2="55952"/>
+                        <a14:foregroundMark x1="32279" y1="56030" x2="33732" y2="54785"/>
+                        <a14:foregroundMark x1="32057" y1="56220" x2="32159" y2="56132"/>
+                        <a14:foregroundMark x1="30622" y1="54785" x2="30622" y2="54785"/>
+                        <a14:foregroundMark x1="31995" y1="48325" x2="32057" y2="47368"/>
+                        <a14:foregroundMark x1="31918" y1="49522" x2="31995" y2="48325"/>
+                        <a14:foregroundMark x1="31817" y1="51085" x2="31918" y2="49522"/>
+                        <a14:foregroundMark x1="31579" y1="54785" x2="31707" y2="52802"/>
+                        <a14:backgroundMark x1="21531" y1="41148" x2="21531" y2="41148"/>
+                        <a14:backgroundMark x1="24163" y1="41866" x2="17943" y2="42105"/>
+                        <a14:backgroundMark x1="32297" y1="50478" x2="32775" y2="50478"/>
+                        <a14:backgroundMark x1="32057" y1="48325" x2="30861" y2="52871"/>
+                        <a14:backgroundMark x1="32057" y1="48804" x2="32536" y2="50957"/>
+                        <a14:backgroundMark x1="32057" y1="48565" x2="32057" y2="48565"/>
+                        <a14:backgroundMark x1="32297" y1="47368" x2="32536" y2="49522"/>
+                        <a14:backgroundMark x1="32057" y1="53349" x2="32057" y2="53349"/>
+                        <a14:backgroundMark x1="33493" y1="57177" x2="33493" y2="57177"/>
+                        <a14:backgroundMark x1="34211" y1="56220" x2="33254" y2="57177"/>
+                        <a14:backgroundMark x1="31818" y1="53828" x2="31818" y2="53828"/>
+                        <a14:backgroundMark x1="31579" y1="53589" x2="31579" y2="53589"/>
+                        <a14:backgroundMark x1="33971" y1="55742" x2="33172" y2="56061"/>
+                        <a14:backgroundMark x1="31100" y1="53110" x2="31340" y2="53349"/>
+                        <a14:backgroundMark x1="19856" y1="58134" x2="18660" y2="58134"/>
+                        <a14:backgroundMark x1="96651" y1="60048" x2="96172" y2="55981"/>
+                        <a14:backgroundMark x1="95455" y1="57895" x2="95455" y2="57895"/>
+                        <a14:backgroundMark x1="95694" y1="56699" x2="95694" y2="56699"/>
+                        <a14:backgroundMark x1="95694" y1="55742" x2="95694" y2="55742"/>
+                        <a14:backgroundMark x1="95455" y1="54785" x2="95455" y2="54785"/>
+                        <a14:backgroundMark x1="95455" y1="56938" x2="95455" y2="56938"/>
+                        <a14:backgroundMark x1="95455" y1="57656" x2="95694" y2="59091"/>
+                        <a14:backgroundMark x1="95455" y1="60287" x2="95215" y2="50957"/>
+                        <a14:backgroundMark x1="95455" y1="50239" x2="96411" y2="52632"/>
+                        <a14:backgroundMark x1="32057" y1="49522" x2="32057" y2="49522"/>
+                        <a14:backgroundMark x1="31579" y1="48325" x2="31579" y2="48325"/>
+                        <a14:backgroundMark x1="32057" y1="51196" x2="31340" y2="52632"/>
+                        <a14:backgroundMark x1="31818" y1="50000" x2="31818" y2="51196"/>
+                        <a14:backgroundMark x1="31579" y1="48086" x2="31579" y2="47129"/>
+                        <a14:backgroundMark x1="29904" y1="54785" x2="29904" y2="54785"/>
+                        <a14:backgroundMark x1="30383" y1="54785" x2="30383" y2="54785"/>
+                        <a14:backgroundMark x1="33254" y1="59569" x2="33254" y2="59091"/>
+                        <a14:backgroundMark x1="33014" y1="58612" x2="33014" y2="58612"/>
+                        <a14:backgroundMark x1="32057" y1="57895" x2="32057" y2="57895"/>
+                        <a14:backgroundMark x1="32775" y1="57895" x2="31100" y2="59569"/>
+                      </a14:backgroundRemoval>
+                    </a14:imgEffect>
+                    <a14:imgEffect>
+                      <a14:saturation sat="0"/>
+                    </a14:imgEffect>
+                  </a14:imgLayer>
+                </a14:imgProps>
+              </a:ext>
+              <a:ext uri="{28A0092B-C50C-407E-A947-70E740481C1C}">
+                <a14:useLocalDpi xmlns:a14="http://schemas.microsoft.com/office/drawing/2010/main" val="0"/>
+              </a:ext>
+            </a:extLst>
+          </a:blip>
+          <a:srcRect t="15187" b="18806"/>
+          <a:stretch/>
+        </p:blipFill>
+        <p:spPr bwMode="auto">
+          <a:xfrm>
+            <a:off x="20475732" y="11018220"/>
+            <a:ext cx="2632201" cy="1737454"/>
+          </a:xfrm>
+          <a:prstGeom prst="rect">
+            <a:avLst/>
+          </a:prstGeom>
+          <a:noFill/>
+          <a:extLst>
+            <a:ext uri="{909E8E84-426E-40DD-AFC4-6F175D3DCCD1}">
+              <a14:hiddenFill xmlns:a14="http://schemas.microsoft.com/office/drawing/2010/main">
+                <a:solidFill>
+                  <a:srgbClr val="FFFFFF"/>
+                </a:solidFill>
+              </a14:hiddenFill>
+            </a:ext>
+          </a:extLst>
+        </p:spPr>
+      </p:pic>
+      <p:sp>
+        <p:nvSpPr>
+          <p:cNvPr id="6" name="TextBox 5">
+            <a:extLst>
+              <a:ext uri="{FF2B5EF4-FFF2-40B4-BE49-F238E27FC236}">
+                <a16:creationId xmlns:a16="http://schemas.microsoft.com/office/drawing/2014/main" id="{8401CB50-710D-E8F1-33C6-4A4DF236A986}"/>
+              </a:ext>
+            </a:extLst>
+          </p:cNvPr>
+          <p:cNvSpPr txBox="1"/>
+          <p:nvPr/>
+        </p:nvSpPr>
+        <p:spPr>
+          <a:xfrm>
+            <a:off x="19849114" y="12906992"/>
+            <a:ext cx="4550615" cy="769441"/>
+          </a:xfrm>
+          <a:prstGeom prst="rect">
+            <a:avLst/>
+          </a:prstGeom>
+          <a:noFill/>
+        </p:spPr>
+        <p:txBody>
+          <a:bodyPr wrap="square" rtlCol="0">
+            <a:spAutoFit/>
+          </a:bodyPr>
+          <a:lstStyle/>
+          <a:p>
+            <a:r>
+              <a:rPr lang="en-US" sz="4400" b="1" dirty="0"/>
+              <a:t>Proximity Sensor</a:t>
+            </a:r>
+          </a:p>
+        </p:txBody>
+      </p:sp>
       <p:cxnSp>
         <p:nvCxnSpPr>
           <p:cNvPr id="17" name="Straight Arrow Connector 16">
             <a:extLst>
               <a:ext uri="{FF2B5EF4-FFF2-40B4-BE49-F238E27FC236}">
-                <a16:creationId xmlns:a16="http://schemas.microsoft.com/office/drawing/2014/main" id="{DC128D96-A007-2890-D691-9E6B599E498E}"/>
+                <a16:creationId xmlns:a16="http://schemas.microsoft.com/office/drawing/2014/main" id="{8254A7B4-BA0E-0E0B-8F25-4FC5A229E57F}"/>
               </a:ext>
             </a:extLst>
           </p:cNvPr>
@@ -4279,7 +4053,7 @@
           <p:cNvPr id="37" name="Straight Arrow Connector 36">
             <a:extLst>
               <a:ext uri="{FF2B5EF4-FFF2-40B4-BE49-F238E27FC236}">
-                <a16:creationId xmlns:a16="http://schemas.microsoft.com/office/drawing/2014/main" id="{42C074DC-ACF6-2DFB-06D0-795B3634F69E}"/>
+                <a16:creationId xmlns:a16="http://schemas.microsoft.com/office/drawing/2014/main" id="{A7D67763-1987-CEF9-7BC7-7946C76A66F6}"/>
               </a:ext>
             </a:extLst>
           </p:cNvPr>
@@ -4290,8 +4064,8 @@
         </p:nvCxnSpPr>
         <p:spPr>
           <a:xfrm flipH="1">
-            <a:off x="7633017" y="12105149"/>
-            <a:ext cx="6662767" cy="1981178"/>
+            <a:off x="7633017" y="14086327"/>
+            <a:ext cx="6167447" cy="0"/>
           </a:xfrm>
           <a:prstGeom prst="straightConnector1">
             <a:avLst/>
@@ -4300,52 +4074,7 @@
             <a:solidFill>
               <a:schemeClr val="tx1"/>
             </a:solidFill>
-            <a:headEnd type="none"/>
-            <a:tailEnd type="triangle"/>
-          </a:ln>
-        </p:spPr>
-        <p:style>
-          <a:lnRef idx="2">
-            <a:schemeClr val="accent1"/>
-          </a:lnRef>
-          <a:fillRef idx="0">
-            <a:schemeClr val="accent1"/>
-          </a:fillRef>
-          <a:effectRef idx="1">
-            <a:schemeClr val="accent1"/>
-          </a:effectRef>
-          <a:fontRef idx="minor">
-            <a:schemeClr val="tx1"/>
-          </a:fontRef>
-        </p:style>
-      </p:cxnSp>
-      <p:cxnSp>
-        <p:nvCxnSpPr>
-          <p:cNvPr id="41" name="Straight Arrow Connector 40">
-            <a:extLst>
-              <a:ext uri="{FF2B5EF4-FFF2-40B4-BE49-F238E27FC236}">
-                <a16:creationId xmlns:a16="http://schemas.microsoft.com/office/drawing/2014/main" id="{05119E4E-5A16-D378-FA5D-3EF1095E2EAE}"/>
-              </a:ext>
-            </a:extLst>
-          </p:cNvPr>
-          <p:cNvCxnSpPr>
-            <a:cxnSpLocks/>
-          </p:cNvCxnSpPr>
-          <p:nvPr/>
-        </p:nvCxnSpPr>
-        <p:spPr>
-          <a:xfrm>
-            <a:off x="8103497" y="14820284"/>
-            <a:ext cx="6804033" cy="1151869"/>
-          </a:xfrm>
-          <a:prstGeom prst="straightConnector1">
-            <a:avLst/>
-          </a:prstGeom>
-          <a:ln w="234950">
-            <a:solidFill>
-              <a:schemeClr val="tx1"/>
-            </a:solidFill>
-            <a:headEnd type="none"/>
+            <a:headEnd type="triangle"/>
             <a:tailEnd type="triangle"/>
           </a:ln>
         </p:spPr>
@@ -4369,7 +4098,7 @@
           <p:cNvPr id="50" name="Straight Arrow Connector 49">
             <a:extLst>
               <a:ext uri="{FF2B5EF4-FFF2-40B4-BE49-F238E27FC236}">
-                <a16:creationId xmlns:a16="http://schemas.microsoft.com/office/drawing/2014/main" id="{80742003-24EC-07A2-439A-E0CE7CC5B2BA}"/>
+                <a16:creationId xmlns:a16="http://schemas.microsoft.com/office/drawing/2014/main" id="{0C0F41E9-EBA5-9BC1-D1C2-67DDCE1D71C7}"/>
               </a:ext>
             </a:extLst>
           </p:cNvPr>
@@ -4415,7 +4144,7 @@
           <p:cNvPr id="54" name="Straight Arrow Connector 53">
             <a:extLst>
               <a:ext uri="{FF2B5EF4-FFF2-40B4-BE49-F238E27FC236}">
-                <a16:creationId xmlns:a16="http://schemas.microsoft.com/office/drawing/2014/main" id="{6531841B-CE48-41AE-CB80-2F7DAFB09542}"/>
+                <a16:creationId xmlns:a16="http://schemas.microsoft.com/office/drawing/2014/main" id="{827E7710-B87F-E24D-CE46-23903397EDB7}"/>
               </a:ext>
             </a:extLst>
           </p:cNvPr>
@@ -4460,7 +4189,7 @@
           <p:cNvPr id="58" name="Straight Arrow Connector 57">
             <a:extLst>
               <a:ext uri="{FF2B5EF4-FFF2-40B4-BE49-F238E27FC236}">
-                <a16:creationId xmlns:a16="http://schemas.microsoft.com/office/drawing/2014/main" id="{96030096-D4FE-FB48-70FC-F240DA61BC8E}"/>
+                <a16:creationId xmlns:a16="http://schemas.microsoft.com/office/drawing/2014/main" id="{A2DEA106-6FDD-20BE-B9F4-4E8B8C3856F0}"/>
               </a:ext>
             </a:extLst>
           </p:cNvPr>
@@ -4505,7 +4234,7 @@
           <p:cNvPr id="1024" name="Straight Arrow Connector 1023">
             <a:extLst>
               <a:ext uri="{FF2B5EF4-FFF2-40B4-BE49-F238E27FC236}">
-                <a16:creationId xmlns:a16="http://schemas.microsoft.com/office/drawing/2014/main" id="{E170DCB2-A821-3F30-6778-00413233F054}"/>
+                <a16:creationId xmlns:a16="http://schemas.microsoft.com/office/drawing/2014/main" id="{F7800046-04A2-9A1B-8DA1-43EA153C18E1}"/>
               </a:ext>
             </a:extLst>
           </p:cNvPr>
@@ -4547,10 +4276,10 @@
       </p:cxnSp>
       <p:cxnSp>
         <p:nvCxnSpPr>
-          <p:cNvPr id="1031" name="Straight Arrow Connector 1030">
+          <p:cNvPr id="14" name="Straight Arrow Connector 13">
             <a:extLst>
               <a:ext uri="{FF2B5EF4-FFF2-40B4-BE49-F238E27FC236}">
-                <a16:creationId xmlns:a16="http://schemas.microsoft.com/office/drawing/2014/main" id="{10C3C936-3283-15F7-DCC2-1EA72725C208}"/>
+                <a16:creationId xmlns:a16="http://schemas.microsoft.com/office/drawing/2014/main" id="{59E52918-3418-8FCD-D659-3A1C00C46A0F}"/>
               </a:ext>
             </a:extLst>
           </p:cNvPr>
@@ -4560,9 +4289,9 @@
           <p:nvPr/>
         </p:nvCxnSpPr>
         <p:spPr>
-          <a:xfrm flipH="1">
-            <a:off x="16919258" y="11889077"/>
-            <a:ext cx="2394955" cy="0"/>
+          <a:xfrm flipV="1">
+            <a:off x="17054671" y="12210051"/>
+            <a:ext cx="2993046" cy="1699238"/>
           </a:xfrm>
           <a:prstGeom prst="straightConnector1">
             <a:avLst/>
@@ -4571,7 +4300,7 @@
             <a:solidFill>
               <a:schemeClr val="tx1"/>
             </a:solidFill>
-            <a:headEnd type="none"/>
+            <a:headEnd type="triangle"/>
             <a:tailEnd type="triangle"/>
           </a:ln>
         </p:spPr>
@@ -4592,10 +4321,10 @@
       </p:cxnSp>
       <p:cxnSp>
         <p:nvCxnSpPr>
-          <p:cNvPr id="1037" name="Straight Arrow Connector 1036">
+          <p:cNvPr id="21" name="Straight Arrow Connector 20">
             <a:extLst>
               <a:ext uri="{FF2B5EF4-FFF2-40B4-BE49-F238E27FC236}">
-                <a16:creationId xmlns:a16="http://schemas.microsoft.com/office/drawing/2014/main" id="{1FBDB0F3-1DAA-D5D5-1020-D7F1394526BF}"/>
+                <a16:creationId xmlns:a16="http://schemas.microsoft.com/office/drawing/2014/main" id="{4FEDABEB-A2AD-18CC-D176-A0A3A7AFDFD9}"/>
               </a:ext>
             </a:extLst>
           </p:cNvPr>
@@ -4606,8 +4335,8 @@
         </p:nvCxnSpPr>
         <p:spPr>
           <a:xfrm>
-            <a:off x="17309623" y="16079544"/>
-            <a:ext cx="2712429" cy="0"/>
+            <a:off x="17203824" y="14205384"/>
+            <a:ext cx="3138626" cy="1168388"/>
           </a:xfrm>
           <a:prstGeom prst="straightConnector1">
             <a:avLst/>
@@ -4616,7 +4345,7 @@
             <a:solidFill>
               <a:schemeClr val="tx1"/>
             </a:solidFill>
-            <a:headEnd type="none"/>
+            <a:headEnd type="triangle"/>
             <a:tailEnd type="triangle"/>
           </a:ln>
         </p:spPr>
@@ -4638,7 +4367,7 @@
     </p:spTree>
     <p:extLst>
       <p:ext uri="{BB962C8B-B14F-4D97-AF65-F5344CB8AC3E}">
-        <p14:creationId xmlns:p14="http://schemas.microsoft.com/office/powerpoint/2010/main" val="2959638776"/>
+        <p14:creationId xmlns:p14="http://schemas.microsoft.com/office/powerpoint/2010/main" val="2406029688"/>
       </p:ext>
     </p:extLst>
   </p:cSld>

</xml_diff>